<commit_message>
Added sales sample without stratification
</commit_message>
<xml_diff>
--- a/presentation - Sales.pptx
+++ b/presentation - Sales.pptx
@@ -6,10 +6,10 @@
     <p:sldMasterId id="2147483891" r:id="rId5"/>
   </p:sldMasterIdLst>
   <p:notesMasterIdLst>
-    <p:notesMasterId r:id="rId19"/>
+    <p:notesMasterId r:id="rId20"/>
   </p:notesMasterIdLst>
   <p:handoutMasterIdLst>
-    <p:handoutMasterId r:id="rId20"/>
+    <p:handoutMasterId r:id="rId21"/>
   </p:handoutMasterIdLst>
   <p:sldIdLst>
     <p:sldId id="260" r:id="rId6"/>
@@ -18,13 +18,14 @@
     <p:sldId id="267" r:id="rId9"/>
     <p:sldId id="266" r:id="rId10"/>
     <p:sldId id="268" r:id="rId11"/>
-    <p:sldId id="273" r:id="rId12"/>
-    <p:sldId id="269" r:id="rId13"/>
-    <p:sldId id="270" r:id="rId14"/>
-    <p:sldId id="271" r:id="rId15"/>
-    <p:sldId id="272" r:id="rId16"/>
-    <p:sldId id="275" r:id="rId17"/>
-    <p:sldId id="274" r:id="rId18"/>
+    <p:sldId id="276" r:id="rId12"/>
+    <p:sldId id="273" r:id="rId13"/>
+    <p:sldId id="269" r:id="rId14"/>
+    <p:sldId id="270" r:id="rId15"/>
+    <p:sldId id="271" r:id="rId16"/>
+    <p:sldId id="272" r:id="rId17"/>
+    <p:sldId id="275" r:id="rId18"/>
+    <p:sldId id="274" r:id="rId19"/>
   </p:sldIdLst>
   <p:sldSz cx="9144000" cy="5143500" type="screen16x9"/>
   <p:notesSz cx="7315200" cy="9601200"/>
@@ -277,7 +278,7 @@
             <a:fld id="{05E48B40-F575-F045-AF98-7241656AD336}" type="datetimeFigureOut">
               <a:rPr lang="en-US" smtClean="0"/>
               <a:pPr/>
-              <a:t>4/2/18</a:t>
+              <a:t>4/5/2018</a:t>
             </a:fld>
             <a:endParaRPr lang="en-US"/>
           </a:p>
@@ -444,7 +445,7 @@
             <a:fld id="{5503108B-28A2-4A1F-97E4-23F53BEF9B1F}" type="datetimeFigureOut">
               <a:rPr lang="en-US" smtClean="0"/>
               <a:pPr/>
-              <a:t>4/2/18</a:t>
+              <a:t>4/5/2018</a:t>
             </a:fld>
             <a:endParaRPr lang="en-US"/>
           </a:p>
@@ -863,7 +864,7 @@
             <a:fld id="{1A47E64D-F0A2-43B3-B0BA-78A854B03B27}" type="slidenum">
               <a:rPr lang="en-US" smtClean="0"/>
               <a:pPr/>
-              <a:t>11</a:t>
+              <a:t>12</a:t>
             </a:fld>
             <a:endParaRPr lang="en-US"/>
           </a:p>
@@ -948,7 +949,7 @@
             <a:fld id="{1A47E64D-F0A2-43B3-B0BA-78A854B03B27}" type="slidenum">
               <a:rPr lang="en-US" smtClean="0"/>
               <a:pPr/>
-              <a:t>12</a:t>
+              <a:t>13</a:t>
             </a:fld>
             <a:endParaRPr lang="en-US"/>
           </a:p>
@@ -17728,6 +17729,13 @@
   <p:transition>
     <p:fade/>
   </p:transition>
+  <p:timing>
+    <p:tnLst>
+      <p:par>
+        <p:cTn id="1" dur="indefinite" restart="never" nodeType="tmRoot"/>
+      </p:par>
+    </p:tnLst>
+  </p:timing>
 </p:sld>
 </file>
 
@@ -17765,80 +17773,106 @@
           <a:p>
             <a:r>
               <a:rPr lang="en-US" dirty="0"/>
-              <a:t>Stratification - Inventory</a:t>
+              <a:t>Certainty Strata - Inventory</a:t>
             </a:r>
           </a:p>
         </p:txBody>
       </p:sp>
       <p:sp>
         <p:nvSpPr>
-          <p:cNvPr id="3" name="Content Placeholder 2"/>
-          <p:cNvSpPr>
-            <a:spLocks noGrp="1"/>
-          </p:cNvSpPr>
+          <p:cNvPr id="5" name="TextBox 4"/>
+          <p:cNvSpPr txBox="1"/>
+          <p:nvPr/>
+        </p:nvSpPr>
+        <p:spPr>
+          <a:xfrm>
+            <a:off x="134471" y="3455894"/>
+            <a:ext cx="8841441" cy="923330"/>
+          </a:xfrm>
+          <a:prstGeom prst="rect">
+            <a:avLst/>
+          </a:prstGeom>
+          <a:noFill/>
+        </p:spPr>
+        <p:txBody>
+          <a:bodyPr wrap="square" rtlCol="0">
+            <a:spAutoFit/>
+          </a:bodyPr>
+          <a:lstStyle/>
+          <a:p>
+            <a:pPr algn="ctr"/>
+            <a:r>
+              <a:rPr lang="en-US" dirty="0">
+                <a:solidFill>
+                  <a:schemeClr val="bg1"/>
+                </a:solidFill>
+              </a:rPr>
+              <a:t>16 Companies Comprise 20% of Overall Total Sales of all 9,762 Companies</a:t>
+            </a:r>
+          </a:p>
+          <a:p>
+            <a:pPr algn="ctr"/>
+            <a:r>
+              <a:rPr lang="en-US" dirty="0">
+                <a:solidFill>
+                  <a:schemeClr val="bg1"/>
+                </a:solidFill>
+              </a:rPr>
+              <a:t>0.1% of all Companies</a:t>
+            </a:r>
+          </a:p>
+          <a:p>
+            <a:pPr algn="ctr"/>
+            <a:endParaRPr lang="en-US" dirty="0">
+              <a:solidFill>
+                <a:schemeClr val="bg1"/>
+              </a:solidFill>
+            </a:endParaRPr>
+          </a:p>
+        </p:txBody>
+      </p:sp>
+      <p:pic>
+        <p:nvPicPr>
+          <p:cNvPr id="9" name="Content Placeholder 8">
+            <a:extLst>
+              <a:ext uri="{FF2B5EF4-FFF2-40B4-BE49-F238E27FC236}">
+                <a16:creationId xmlns:a16="http://schemas.microsoft.com/office/drawing/2014/main" id="{D6BDE974-AEE9-AC4B-B3BD-5E6EFC9507F5}"/>
+              </a:ext>
+            </a:extLst>
+          </p:cNvPr>
+          <p:cNvPicPr>
+            <a:picLocks noGrp="1" noChangeAspect="1"/>
+          </p:cNvPicPr>
           <p:nvPr>
             <p:ph idx="1"/>
           </p:nvPr>
-        </p:nvSpPr>
-        <p:spPr/>
-        <p:txBody>
-          <a:bodyPr/>
-          <a:lstStyle/>
-          <a:p>
-            <a:r>
-              <a:rPr lang="en-US" dirty="0"/>
-              <a:t>Based on Scatterplots and Histograms, again guessed there were 6 to 10 clear groups of observations</a:t>
-            </a:r>
-          </a:p>
-          <a:p>
-            <a:r>
-              <a:rPr lang="en-US" dirty="0"/>
-              <a:t>Used R library </a:t>
-            </a:r>
-            <a:r>
-              <a:rPr lang="en-US" i="1" dirty="0"/>
-              <a:t>stratification, </a:t>
-            </a:r>
-            <a:r>
-              <a:rPr lang="en-US" dirty="0"/>
-              <a:t>the </a:t>
-            </a:r>
-            <a:r>
-              <a:rPr lang="en-US" dirty="0" err="1"/>
-              <a:t>strat.cumrootf</a:t>
-            </a:r>
-            <a:r>
-              <a:rPr lang="en-US" dirty="0"/>
-              <a:t>() function to perform the assignment of observations to strata and then perform the </a:t>
-            </a:r>
-            <a:r>
-              <a:rPr lang="en-US" dirty="0" err="1"/>
-              <a:t>Neyman</a:t>
-            </a:r>
-            <a:r>
-              <a:rPr lang="en-US" dirty="0"/>
-              <a:t> allocation</a:t>
-            </a:r>
-          </a:p>
-          <a:p>
-            <a:r>
-              <a:rPr lang="en-US" dirty="0"/>
-              <a:t>Tested 6, 7, and 8 (including certainty) </a:t>
-            </a:r>
-          </a:p>
-          <a:p>
-            <a:pPr lvl="1"/>
-            <a:r>
-              <a:rPr lang="en-US" dirty="0"/>
-              <a:t>8 Strata returned a lower standard error of the sum and was selected for the full stratification</a:t>
-            </a:r>
-          </a:p>
-        </p:txBody>
-      </p:sp>
+        </p:nvPicPr>
+        <p:blipFill>
+          <a:blip r:embed="rId2">
+            <a:extLst>
+              <a:ext uri="{28A0092B-C50C-407E-A947-70E740481C1C}">
+                <a14:useLocalDpi xmlns:a14="http://schemas.microsoft.com/office/drawing/2010/main" val="0"/>
+              </a:ext>
+            </a:extLst>
+          </a:blip>
+          <a:stretch>
+            <a:fillRect/>
+          </a:stretch>
+        </p:blipFill>
+        <p:spPr>
+          <a:xfrm>
+            <a:off x="317500" y="1519822"/>
+            <a:ext cx="8556625" cy="1711325"/>
+          </a:xfrm>
+          <a:prstGeom prst="rect">
+            <a:avLst/>
+          </a:prstGeom>
+        </p:spPr>
+      </p:pic>
     </p:spTree>
     <p:extLst>
       <p:ext uri="{BB962C8B-B14F-4D97-AF65-F5344CB8AC3E}">
-        <p14:creationId xmlns:p14="http://schemas.microsoft.com/office/powerpoint/2010/main" val="1485703427"/>
+        <p14:creationId xmlns:p14="http://schemas.microsoft.com/office/powerpoint/2010/main" val="2370471185"/>
       </p:ext>
     </p:extLst>
   </p:cSld>
@@ -17885,163 +17919,80 @@
           <a:p>
             <a:r>
               <a:rPr lang="en-US" dirty="0"/>
-              <a:t>Results – Inventory Eight Strata Allocation</a:t>
+              <a:t>Stratification - Inventory</a:t>
             </a:r>
           </a:p>
         </p:txBody>
       </p:sp>
       <p:sp>
         <p:nvSpPr>
-          <p:cNvPr id="5" name="Rectangle 4"/>
-          <p:cNvSpPr/>
-          <p:nvPr/>
+          <p:cNvPr id="3" name="Content Placeholder 2"/>
+          <p:cNvSpPr>
+            <a:spLocks noGrp="1"/>
+          </p:cNvSpPr>
+          <p:nvPr>
+            <p:ph idx="1"/>
+          </p:nvPr>
         </p:nvSpPr>
-        <p:spPr>
-          <a:xfrm>
-            <a:off x="2237867" y="4283120"/>
-            <a:ext cx="4668266" cy="646331"/>
-          </a:xfrm>
-          <a:prstGeom prst="rect">
-            <a:avLst/>
-          </a:prstGeom>
-        </p:spPr>
+        <p:spPr/>
         <p:txBody>
-          <a:bodyPr wrap="none">
-            <a:spAutoFit/>
-          </a:bodyPr>
+          <a:bodyPr/>
           <a:lstStyle/>
           <a:p>
-            <a:pPr algn="ctr"/>
-            <a:r>
-              <a:rPr lang="de-DE" dirty="0">
-                <a:solidFill>
-                  <a:schemeClr val="bg1"/>
-                </a:solidFill>
-                <a:ea typeface="Futura Com Book" panose="02000504030000020003" pitchFamily="2" charset="0"/>
-                <a:cs typeface="Times New Roman" panose="02020603050405020304" pitchFamily="18" charset="0"/>
-              </a:rPr>
-              <a:t>True </a:t>
-            </a:r>
-            <a:r>
-              <a:rPr lang="de-DE" dirty="0" err="1">
-                <a:solidFill>
-                  <a:schemeClr val="bg1"/>
-                </a:solidFill>
-                <a:ea typeface="Futura Com Book" panose="02000504030000020003" pitchFamily="2" charset="0"/>
-                <a:cs typeface="Times New Roman" panose="02020603050405020304" pitchFamily="18" charset="0"/>
-              </a:rPr>
-              <a:t>Sum</a:t>
-            </a:r>
-            <a:r>
-              <a:rPr lang="de-DE" dirty="0">
-                <a:solidFill>
-                  <a:schemeClr val="bg1"/>
-                </a:solidFill>
-                <a:ea typeface="Futura Com Book" panose="02000504030000020003" pitchFamily="2" charset="0"/>
-                <a:cs typeface="Times New Roman" panose="02020603050405020304" pitchFamily="18" charset="0"/>
-              </a:rPr>
-              <a:t> </a:t>
-            </a:r>
-            <a:r>
-              <a:rPr lang="de-DE" dirty="0" err="1">
-                <a:solidFill>
-                  <a:schemeClr val="bg1"/>
-                </a:solidFill>
-                <a:ea typeface="Futura Com Book" panose="02000504030000020003" pitchFamily="2" charset="0"/>
-                <a:cs typeface="Times New Roman" panose="02020603050405020304" pitchFamily="18" charset="0"/>
-              </a:rPr>
-              <a:t>of</a:t>
-            </a:r>
-            <a:r>
-              <a:rPr lang="de-DE" dirty="0">
-                <a:solidFill>
-                  <a:schemeClr val="bg1"/>
-                </a:solidFill>
-                <a:ea typeface="Futura Com Book" panose="02000504030000020003" pitchFamily="2" charset="0"/>
-                <a:cs typeface="Times New Roman" panose="02020603050405020304" pitchFamily="18" charset="0"/>
-              </a:rPr>
-              <a:t> </a:t>
-            </a:r>
-            <a:r>
-              <a:rPr lang="de-DE" dirty="0" err="1">
-                <a:solidFill>
-                  <a:schemeClr val="bg1"/>
-                </a:solidFill>
-                <a:ea typeface="Futura Com Book" panose="02000504030000020003" pitchFamily="2" charset="0"/>
-                <a:cs typeface="Times New Roman" panose="02020603050405020304" pitchFamily="18" charset="0"/>
-              </a:rPr>
-              <a:t>Inventory</a:t>
-            </a:r>
-            <a:r>
-              <a:rPr lang="de-DE" dirty="0">
-                <a:solidFill>
-                  <a:schemeClr val="bg1"/>
-                </a:solidFill>
-                <a:ea typeface="Futura Com Book" panose="02000504030000020003" pitchFamily="2" charset="0"/>
-                <a:cs typeface="Times New Roman" panose="02020603050405020304" pitchFamily="18" charset="0"/>
-              </a:rPr>
-              <a:t>: 1,745,954,823</a:t>
-            </a:r>
-          </a:p>
-          <a:p>
-            <a:pPr algn="ctr"/>
-            <a:r>
-              <a:rPr lang="de-DE" dirty="0">
-                <a:solidFill>
-                  <a:schemeClr val="bg1"/>
-                </a:solidFill>
-                <a:cs typeface="Times New Roman" panose="02020603050405020304" pitchFamily="18" charset="0"/>
-              </a:rPr>
-              <a:t>All Samples are Within Confidence Intervals</a:t>
-            </a:r>
-            <a:endParaRPr lang="en-US" dirty="0">
-              <a:solidFill>
-                <a:schemeClr val="bg1"/>
-              </a:solidFill>
-            </a:endParaRPr>
+            <a:r>
+              <a:rPr lang="en-US" dirty="0"/>
+              <a:t>Based on Scatterplots and Histograms, again guessed there were 6 to 10 clear groups of observations</a:t>
+            </a:r>
+          </a:p>
+          <a:p>
+            <a:r>
+              <a:rPr lang="en-US" dirty="0"/>
+              <a:t>Used R library </a:t>
+            </a:r>
+            <a:r>
+              <a:rPr lang="en-US" i="1" dirty="0"/>
+              <a:t>stratification, </a:t>
+            </a:r>
+            <a:r>
+              <a:rPr lang="en-US" dirty="0"/>
+              <a:t>the </a:t>
+            </a:r>
+            <a:r>
+              <a:rPr lang="en-US" dirty="0" err="1"/>
+              <a:t>strat.cumrootf</a:t>
+            </a:r>
+            <a:r>
+              <a:rPr lang="en-US" dirty="0"/>
+              <a:t>() function to perform the assignment of observations to strata and then perform the </a:t>
+            </a:r>
+            <a:r>
+              <a:rPr lang="en-US" dirty="0" err="1"/>
+              <a:t>Neyman</a:t>
+            </a:r>
+            <a:r>
+              <a:rPr lang="en-US" dirty="0"/>
+              <a:t> allocation</a:t>
+            </a:r>
+          </a:p>
+          <a:p>
+            <a:r>
+              <a:rPr lang="en-US" dirty="0"/>
+              <a:t>Tested 6, 7, and 8 (including certainty) </a:t>
+            </a:r>
+          </a:p>
+          <a:p>
+            <a:pPr lvl="1"/>
+            <a:r>
+              <a:rPr lang="en-US" dirty="0"/>
+              <a:t>8 Strata returned a lower standard error of the sum and was selected for the full stratification</a:t>
+            </a:r>
           </a:p>
         </p:txBody>
       </p:sp>
-      <p:pic>
-        <p:nvPicPr>
-          <p:cNvPr id="8" name="Picture 7">
-            <a:extLst>
-              <a:ext uri="{FF2B5EF4-FFF2-40B4-BE49-F238E27FC236}">
-                <a16:creationId xmlns:a16="http://schemas.microsoft.com/office/drawing/2014/main" id="{0766B341-66C5-F644-84B0-F080EB25FE79}"/>
-              </a:ext>
-            </a:extLst>
-          </p:cNvPr>
-          <p:cNvPicPr>
-            <a:picLocks noChangeAspect="1"/>
-          </p:cNvPicPr>
-          <p:nvPr/>
-        </p:nvPicPr>
-        <p:blipFill>
-          <a:blip r:embed="rId3">
-            <a:extLst>
-              <a:ext uri="{28A0092B-C50C-407E-A947-70E740481C1C}">
-                <a14:useLocalDpi xmlns:a14="http://schemas.microsoft.com/office/drawing/2010/main" val="0"/>
-              </a:ext>
-            </a:extLst>
-          </a:blip>
-          <a:stretch>
-            <a:fillRect/>
-          </a:stretch>
-        </p:blipFill>
-        <p:spPr>
-          <a:xfrm>
-            <a:off x="0" y="1598984"/>
-            <a:ext cx="9144000" cy="1945532"/>
-          </a:xfrm>
-          <a:prstGeom prst="rect">
-            <a:avLst/>
-          </a:prstGeom>
-        </p:spPr>
-      </p:pic>
     </p:spTree>
     <p:extLst>
       <p:ext uri="{BB962C8B-B14F-4D97-AF65-F5344CB8AC3E}">
-        <p14:creationId xmlns:p14="http://schemas.microsoft.com/office/powerpoint/2010/main" val="2619367923"/>
+        <p14:creationId xmlns:p14="http://schemas.microsoft.com/office/powerpoint/2010/main" val="1485703427"/>
       </p:ext>
     </p:extLst>
   </p:cSld>
@@ -18095,6 +18046,216 @@
       </p:sp>
       <p:sp>
         <p:nvSpPr>
+          <p:cNvPr id="5" name="Rectangle 4"/>
+          <p:cNvSpPr/>
+          <p:nvPr/>
+        </p:nvSpPr>
+        <p:spPr>
+          <a:xfrm>
+            <a:off x="2237867" y="4283120"/>
+            <a:ext cx="4668266" cy="646331"/>
+          </a:xfrm>
+          <a:prstGeom prst="rect">
+            <a:avLst/>
+          </a:prstGeom>
+        </p:spPr>
+        <p:txBody>
+          <a:bodyPr wrap="none">
+            <a:spAutoFit/>
+          </a:bodyPr>
+          <a:lstStyle/>
+          <a:p>
+            <a:pPr algn="ctr"/>
+            <a:r>
+              <a:rPr lang="de-DE" dirty="0">
+                <a:solidFill>
+                  <a:schemeClr val="bg1"/>
+                </a:solidFill>
+                <a:ea typeface="Futura Com Book" panose="02000504030000020003" pitchFamily="2" charset="0"/>
+                <a:cs typeface="Times New Roman" panose="02020603050405020304" pitchFamily="18" charset="0"/>
+              </a:rPr>
+              <a:t>True </a:t>
+            </a:r>
+            <a:r>
+              <a:rPr lang="de-DE" dirty="0" err="1">
+                <a:solidFill>
+                  <a:schemeClr val="bg1"/>
+                </a:solidFill>
+                <a:ea typeface="Futura Com Book" panose="02000504030000020003" pitchFamily="2" charset="0"/>
+                <a:cs typeface="Times New Roman" panose="02020603050405020304" pitchFamily="18" charset="0"/>
+              </a:rPr>
+              <a:t>Sum</a:t>
+            </a:r>
+            <a:r>
+              <a:rPr lang="de-DE" dirty="0">
+                <a:solidFill>
+                  <a:schemeClr val="bg1"/>
+                </a:solidFill>
+                <a:ea typeface="Futura Com Book" panose="02000504030000020003" pitchFamily="2" charset="0"/>
+                <a:cs typeface="Times New Roman" panose="02020603050405020304" pitchFamily="18" charset="0"/>
+              </a:rPr>
+              <a:t> </a:t>
+            </a:r>
+            <a:r>
+              <a:rPr lang="de-DE" dirty="0" err="1">
+                <a:solidFill>
+                  <a:schemeClr val="bg1"/>
+                </a:solidFill>
+                <a:ea typeface="Futura Com Book" panose="02000504030000020003" pitchFamily="2" charset="0"/>
+                <a:cs typeface="Times New Roman" panose="02020603050405020304" pitchFamily="18" charset="0"/>
+              </a:rPr>
+              <a:t>of</a:t>
+            </a:r>
+            <a:r>
+              <a:rPr lang="de-DE" dirty="0">
+                <a:solidFill>
+                  <a:schemeClr val="bg1"/>
+                </a:solidFill>
+                <a:ea typeface="Futura Com Book" panose="02000504030000020003" pitchFamily="2" charset="0"/>
+                <a:cs typeface="Times New Roman" panose="02020603050405020304" pitchFamily="18" charset="0"/>
+              </a:rPr>
+              <a:t> </a:t>
+            </a:r>
+            <a:r>
+              <a:rPr lang="de-DE" dirty="0" err="1">
+                <a:solidFill>
+                  <a:schemeClr val="bg1"/>
+                </a:solidFill>
+                <a:ea typeface="Futura Com Book" panose="02000504030000020003" pitchFamily="2" charset="0"/>
+                <a:cs typeface="Times New Roman" panose="02020603050405020304" pitchFamily="18" charset="0"/>
+              </a:rPr>
+              <a:t>Inventory</a:t>
+            </a:r>
+            <a:r>
+              <a:rPr lang="de-DE" dirty="0">
+                <a:solidFill>
+                  <a:schemeClr val="bg1"/>
+                </a:solidFill>
+                <a:ea typeface="Futura Com Book" panose="02000504030000020003" pitchFamily="2" charset="0"/>
+                <a:cs typeface="Times New Roman" panose="02020603050405020304" pitchFamily="18" charset="0"/>
+              </a:rPr>
+              <a:t>: 1,745,954,823</a:t>
+            </a:r>
+          </a:p>
+          <a:p>
+            <a:pPr algn="ctr"/>
+            <a:r>
+              <a:rPr lang="de-DE" dirty="0">
+                <a:solidFill>
+                  <a:schemeClr val="bg1"/>
+                </a:solidFill>
+                <a:cs typeface="Times New Roman" panose="02020603050405020304" pitchFamily="18" charset="0"/>
+              </a:rPr>
+              <a:t>All Samples are Within Confidence Intervals</a:t>
+            </a:r>
+            <a:endParaRPr lang="en-US" dirty="0">
+              <a:solidFill>
+                <a:schemeClr val="bg1"/>
+              </a:solidFill>
+            </a:endParaRPr>
+          </a:p>
+        </p:txBody>
+      </p:sp>
+      <p:pic>
+        <p:nvPicPr>
+          <p:cNvPr id="8" name="Picture 7">
+            <a:extLst>
+              <a:ext uri="{FF2B5EF4-FFF2-40B4-BE49-F238E27FC236}">
+                <a16:creationId xmlns:a16="http://schemas.microsoft.com/office/drawing/2014/main" id="{0766B341-66C5-F644-84B0-F080EB25FE79}"/>
+              </a:ext>
+            </a:extLst>
+          </p:cNvPr>
+          <p:cNvPicPr>
+            <a:picLocks noChangeAspect="1"/>
+          </p:cNvPicPr>
+          <p:nvPr/>
+        </p:nvPicPr>
+        <p:blipFill>
+          <a:blip r:embed="rId3">
+            <a:extLst>
+              <a:ext uri="{28A0092B-C50C-407E-A947-70E740481C1C}">
+                <a14:useLocalDpi xmlns:a14="http://schemas.microsoft.com/office/drawing/2010/main" val="0"/>
+              </a:ext>
+            </a:extLst>
+          </a:blip>
+          <a:stretch>
+            <a:fillRect/>
+          </a:stretch>
+        </p:blipFill>
+        <p:spPr>
+          <a:xfrm>
+            <a:off x="0" y="1598984"/>
+            <a:ext cx="9144000" cy="1945532"/>
+          </a:xfrm>
+          <a:prstGeom prst="rect">
+            <a:avLst/>
+          </a:prstGeom>
+        </p:spPr>
+      </p:pic>
+    </p:spTree>
+    <p:extLst>
+      <p:ext uri="{BB962C8B-B14F-4D97-AF65-F5344CB8AC3E}">
+        <p14:creationId xmlns:p14="http://schemas.microsoft.com/office/powerpoint/2010/main" val="2619367923"/>
+      </p:ext>
+    </p:extLst>
+  </p:cSld>
+  <p:clrMapOvr>
+    <a:masterClrMapping/>
+  </p:clrMapOvr>
+  <p:transition>
+    <p:fade/>
+  </p:transition>
+  <p:timing>
+    <p:tnLst>
+      <p:par>
+        <p:cTn id="1" dur="indefinite" restart="never" nodeType="tmRoot"/>
+      </p:par>
+    </p:tnLst>
+  </p:timing>
+</p:sld>
+</file>
+
+<file path=ppt/slides/slide13.xml><?xml version="1.0" encoding="utf-8"?>
+<p:sld xmlns:a="http://schemas.openxmlformats.org/drawingml/2006/main" xmlns:r="http://schemas.openxmlformats.org/officeDocument/2006/relationships" xmlns:p="http://schemas.openxmlformats.org/presentationml/2006/main">
+  <p:cSld>
+    <p:spTree>
+      <p:nvGrpSpPr>
+        <p:cNvPr id="1" name=""/>
+        <p:cNvGrpSpPr/>
+        <p:nvPr/>
+      </p:nvGrpSpPr>
+      <p:grpSpPr>
+        <a:xfrm>
+          <a:off x="0" y="0"/>
+          <a:ext cx="0" cy="0"/>
+          <a:chOff x="0" y="0"/>
+          <a:chExt cx="0" cy="0"/>
+        </a:xfrm>
+      </p:grpSpPr>
+      <p:sp>
+        <p:nvSpPr>
+          <p:cNvPr id="2" name="Title 1"/>
+          <p:cNvSpPr>
+            <a:spLocks noGrp="1"/>
+          </p:cNvSpPr>
+          <p:nvPr>
+            <p:ph type="title"/>
+          </p:nvPr>
+        </p:nvSpPr>
+        <p:spPr/>
+        <p:txBody>
+          <a:bodyPr/>
+          <a:lstStyle/>
+          <a:p>
+            <a:r>
+              <a:rPr lang="en-US" dirty="0"/>
+              <a:t>Results – Inventory Eight Strata Allocation</a:t>
+            </a:r>
+          </a:p>
+        </p:txBody>
+      </p:sp>
+      <p:sp>
+        <p:nvSpPr>
           <p:cNvPr id="3" name="Content Placeholder 2">
             <a:extLst>
               <a:ext uri="{FF2B5EF4-FFF2-40B4-BE49-F238E27FC236}">
@@ -18434,7 +18595,7 @@
 </p:sld>
 </file>
 
-<file path=ppt/slides/slide13.xml><?xml version="1.0" encoding="utf-8"?>
+<file path=ppt/slides/slide14.xml><?xml version="1.0" encoding="utf-8"?>
 <p:sld xmlns:a="http://schemas.openxmlformats.org/drawingml/2006/main" xmlns:r="http://schemas.openxmlformats.org/officeDocument/2006/relationships" xmlns:p="http://schemas.openxmlformats.org/presentationml/2006/main">
   <p:cSld>
     <p:spTree>
@@ -20911,10 +21072,118 @@
   <p:transition>
     <p:fade/>
   </p:transition>
+  <p:timing>
+    <p:tnLst>
+      <p:par>
+        <p:cTn id="1" dur="indefinite" restart="never" nodeType="tmRoot"/>
+      </p:par>
+    </p:tnLst>
+  </p:timing>
 </p:sld>
 </file>
 
 <file path=ppt/slides/slide7.xml><?xml version="1.0" encoding="utf-8"?>
+<p:sld xmlns:a="http://schemas.openxmlformats.org/drawingml/2006/main" xmlns:r="http://schemas.openxmlformats.org/officeDocument/2006/relationships" xmlns:p="http://schemas.openxmlformats.org/presentationml/2006/main">
+  <p:cSld>
+    <p:spTree>
+      <p:nvGrpSpPr>
+        <p:cNvPr id="1" name=""/>
+        <p:cNvGrpSpPr/>
+        <p:nvPr/>
+      </p:nvGrpSpPr>
+      <p:grpSpPr>
+        <a:xfrm>
+          <a:off x="0" y="0"/>
+          <a:ext cx="0" cy="0"/>
+          <a:chOff x="0" y="0"/>
+          <a:chExt cx="0" cy="0"/>
+        </a:xfrm>
+      </p:grpSpPr>
+      <p:sp>
+        <p:nvSpPr>
+          <p:cNvPr id="2" name="Title 1"/>
+          <p:cNvSpPr>
+            <a:spLocks noGrp="1"/>
+          </p:cNvSpPr>
+          <p:nvPr>
+            <p:ph type="title"/>
+          </p:nvPr>
+        </p:nvSpPr>
+        <p:spPr/>
+        <p:txBody>
+          <a:bodyPr/>
+          <a:lstStyle/>
+          <a:p>
+            <a:r>
+              <a:rPr lang="en-US" dirty="0" smtClean="0"/>
+              <a:t>Simple Random Sample, No Stratification</a:t>
+            </a:r>
+            <a:endParaRPr lang="en-US" dirty="0"/>
+          </a:p>
+        </p:txBody>
+      </p:sp>
+      <p:sp>
+        <p:nvSpPr>
+          <p:cNvPr id="3" name="Content Placeholder 2"/>
+          <p:cNvSpPr>
+            <a:spLocks noGrp="1"/>
+          </p:cNvSpPr>
+          <p:nvPr>
+            <p:ph idx="1"/>
+          </p:nvPr>
+        </p:nvSpPr>
+        <p:spPr/>
+        <p:txBody>
+          <a:bodyPr/>
+          <a:lstStyle/>
+          <a:p>
+            <a:r>
+              <a:rPr lang="en-US" dirty="0" smtClean="0"/>
+              <a:t>Mean: $123,775</a:t>
+            </a:r>
+          </a:p>
+          <a:p>
+            <a:pPr lvl="1"/>
+            <a:r>
+              <a:rPr lang="en-US" dirty="0" smtClean="0"/>
+              <a:t>Under estimates the mean by about $20,000 * More than 9,000 Observations</a:t>
+            </a:r>
+          </a:p>
+          <a:p>
+            <a:r>
+              <a:rPr lang="en-US" dirty="0" smtClean="0"/>
+              <a:t>Estimate of the Population: $61,887,665</a:t>
+            </a:r>
+          </a:p>
+          <a:p>
+            <a:endParaRPr lang="en-US" dirty="0"/>
+          </a:p>
+        </p:txBody>
+      </p:sp>
+    </p:spTree>
+    <p:extLst>
+      <p:ext uri="{BB962C8B-B14F-4D97-AF65-F5344CB8AC3E}">
+        <p14:creationId xmlns:p14="http://schemas.microsoft.com/office/powerpoint/2010/main" val="440388676"/>
+      </p:ext>
+    </p:extLst>
+  </p:cSld>
+  <p:clrMapOvr>
+    <a:masterClrMapping/>
+  </p:clrMapOvr>
+  <p:transition>
+    <p:fade/>
+  </p:transition>
+  <p:timing>
+    <p:tnLst>
+      <p:par>
+        <p:cTn id="1" dur="indefinite" restart="never" nodeType="tmRoot"/>
+      </p:par>
+    </p:tnLst>
+  </p:timing>
+</p:sld>
+</file>
+
+<file path=ppt/slides/slide8.xml><?xml version="1.0" encoding="utf-8"?>
 <p:sld xmlns:a="http://schemas.openxmlformats.org/drawingml/2006/main" xmlns:r="http://schemas.openxmlformats.org/officeDocument/2006/relationships" xmlns:p="http://schemas.openxmlformats.org/presentationml/2006/main">
   <p:cSld>
     <p:spTree>
@@ -20978,194 +21247,13 @@
   <p:transition>
     <p:fade/>
   </p:transition>
-</p:sld>
-</file>
-
-<file path=ppt/slides/slide8.xml><?xml version="1.0" encoding="utf-8"?>
-<p:sld xmlns:a="http://schemas.openxmlformats.org/drawingml/2006/main" xmlns:r="http://schemas.openxmlformats.org/officeDocument/2006/relationships" xmlns:p="http://schemas.openxmlformats.org/presentationml/2006/main">
-  <p:cSld>
-    <p:spTree>
-      <p:nvGrpSpPr>
-        <p:cNvPr id="1" name=""/>
-        <p:cNvGrpSpPr/>
-        <p:nvPr/>
-      </p:nvGrpSpPr>
-      <p:grpSpPr>
-        <a:xfrm>
-          <a:off x="0" y="0"/>
-          <a:ext cx="0" cy="0"/>
-          <a:chOff x="0" y="0"/>
-          <a:chExt cx="0" cy="0"/>
-        </a:xfrm>
-      </p:grpSpPr>
-      <p:sp>
-        <p:nvSpPr>
-          <p:cNvPr id="2" name="Title 1"/>
-          <p:cNvSpPr>
-            <a:spLocks noGrp="1"/>
-          </p:cNvSpPr>
-          <p:nvPr>
-            <p:ph type="title"/>
-          </p:nvPr>
-        </p:nvSpPr>
-        <p:spPr/>
-        <p:txBody>
-          <a:bodyPr/>
-          <a:lstStyle/>
-          <a:p>
-            <a:r>
-              <a:rPr lang="en-US" dirty="0"/>
-              <a:t>Data Exploration – Inventory</a:t>
-            </a:r>
-          </a:p>
-        </p:txBody>
-      </p:sp>
-      <p:sp>
-        <p:nvSpPr>
-          <p:cNvPr id="5" name="TextBox 4"/>
-          <p:cNvSpPr txBox="1"/>
-          <p:nvPr/>
-        </p:nvSpPr>
-        <p:spPr>
-          <a:xfrm>
-            <a:off x="185853" y="3716448"/>
-            <a:ext cx="8816897" cy="1569660"/>
-          </a:xfrm>
-          <a:prstGeom prst="rect">
-            <a:avLst/>
-          </a:prstGeom>
-          <a:noFill/>
-        </p:spPr>
-        <p:txBody>
-          <a:bodyPr wrap="square" rtlCol="0">
-            <a:spAutoFit/>
-          </a:bodyPr>
-          <a:lstStyle/>
-          <a:p>
-            <a:pPr algn="ctr"/>
-            <a:r>
-              <a:rPr lang="en-US" sz="2400" dirty="0">
-                <a:solidFill>
-                  <a:schemeClr val="bg1"/>
-                </a:solidFill>
-              </a:rPr>
-              <a:t>Mean: 179774.1</a:t>
-            </a:r>
-          </a:p>
-          <a:p>
-            <a:pPr algn="ctr"/>
-            <a:r>
-              <a:rPr lang="en-US" sz="2400" dirty="0">
-                <a:solidFill>
-                  <a:schemeClr val="bg1"/>
-                </a:solidFill>
-              </a:rPr>
-              <a:t>Median: 55629.19</a:t>
-            </a:r>
-          </a:p>
-          <a:p>
-            <a:pPr algn="ctr"/>
-            <a:r>
-              <a:rPr lang="en-US" sz="2400" dirty="0">
-                <a:solidFill>
-                  <a:schemeClr val="bg1"/>
-                </a:solidFill>
-              </a:rPr>
-              <a:t>Long Tails in Both Ranges – From &lt;8000 to &gt;12Mil</a:t>
-            </a:r>
-          </a:p>
-          <a:p>
-            <a:pPr algn="ctr"/>
-            <a:endParaRPr lang="en-US" sz="2400" dirty="0">
-              <a:solidFill>
-                <a:schemeClr val="bg1"/>
-              </a:solidFill>
-            </a:endParaRPr>
-          </a:p>
-        </p:txBody>
-      </p:sp>
-      <p:sp>
-        <p:nvSpPr>
-          <p:cNvPr id="6" name="TextBox 5"/>
-          <p:cNvSpPr txBox="1"/>
-          <p:nvPr/>
-        </p:nvSpPr>
-        <p:spPr>
-          <a:xfrm>
-            <a:off x="0" y="4901453"/>
-            <a:ext cx="8458200" cy="230832"/>
-          </a:xfrm>
-          <a:prstGeom prst="rect">
-            <a:avLst/>
-          </a:prstGeom>
-          <a:noFill/>
-        </p:spPr>
-        <p:txBody>
-          <a:bodyPr wrap="square" rtlCol="0">
-            <a:spAutoFit/>
-          </a:bodyPr>
-          <a:lstStyle/>
-          <a:p>
-            <a:r>
-              <a:rPr lang="en-US" sz="900" dirty="0">
-                <a:solidFill>
-                  <a:schemeClr val="bg1"/>
-                </a:solidFill>
-              </a:rPr>
-              <a:t>NOTE: X-AXIS SHOWN ON LOG BASE 10 SCALE</a:t>
-            </a:r>
-          </a:p>
-        </p:txBody>
-      </p:sp>
-      <p:pic>
-        <p:nvPicPr>
-          <p:cNvPr id="7" name="Picture 6">
-            <a:extLst>
-              <a:ext uri="{FF2B5EF4-FFF2-40B4-BE49-F238E27FC236}">
-                <a16:creationId xmlns:a16="http://schemas.microsoft.com/office/drawing/2014/main" id="{7AD177BB-C5F5-4346-AB60-1776B1ACB004}"/>
-              </a:ext>
-            </a:extLst>
-          </p:cNvPr>
-          <p:cNvPicPr>
-            <a:picLocks noChangeAspect="1"/>
-          </p:cNvPicPr>
-          <p:nvPr/>
-        </p:nvPicPr>
-        <p:blipFill>
-          <a:blip r:embed="rId2">
-            <a:extLst>
-              <a:ext uri="{28A0092B-C50C-407E-A947-70E740481C1C}">
-                <a14:useLocalDpi xmlns:a14="http://schemas.microsoft.com/office/drawing/2010/main" val="0"/>
-              </a:ext>
-            </a:extLst>
-          </a:blip>
-          <a:stretch>
-            <a:fillRect/>
-          </a:stretch>
-        </p:blipFill>
-        <p:spPr>
-          <a:xfrm>
-            <a:off x="0" y="1657350"/>
-            <a:ext cx="9144000" cy="1828800"/>
-          </a:xfrm>
-          <a:prstGeom prst="rect">
-            <a:avLst/>
-          </a:prstGeom>
-        </p:spPr>
-      </p:pic>
-    </p:spTree>
-    <p:extLst>
-      <p:ext uri="{BB962C8B-B14F-4D97-AF65-F5344CB8AC3E}">
-        <p14:creationId xmlns:p14="http://schemas.microsoft.com/office/powerpoint/2010/main" val="167675587"/>
-      </p:ext>
-    </p:extLst>
-  </p:cSld>
-  <p:clrMapOvr>
-    <a:masterClrMapping/>
-  </p:clrMapOvr>
-  <p:transition>
-    <p:fade/>
-  </p:transition>
+  <p:timing>
+    <p:tnLst>
+      <p:par>
+        <p:cTn id="1" dur="indefinite" restart="never" nodeType="tmRoot"/>
+      </p:par>
+    </p:tnLst>
+  </p:timing>
 </p:sld>
 </file>
 
@@ -21203,7 +21291,7 @@
           <a:p>
             <a:r>
               <a:rPr lang="en-US" dirty="0"/>
-              <a:t>Certainty Strata - Inventory</a:t>
+              <a:t>Data Exploration – Inventory</a:t>
             </a:r>
           </a:p>
         </p:txBody>
@@ -21216,8 +21304,8 @@
         </p:nvSpPr>
         <p:spPr>
           <a:xfrm>
-            <a:off x="134471" y="3455894"/>
-            <a:ext cx="8841441" cy="923330"/>
+            <a:off x="185853" y="3716448"/>
+            <a:ext cx="8816897" cy="1569660"/>
           </a:xfrm>
           <a:prstGeom prst="rect">
             <a:avLst/>
@@ -21232,28 +21320,39 @@
           <a:p>
             <a:pPr algn="ctr"/>
             <a:r>
-              <a:rPr lang="en-US" dirty="0">
+              <a:rPr lang="en-US" sz="2400" dirty="0">
                 <a:solidFill>
                   <a:schemeClr val="bg1"/>
                 </a:solidFill>
               </a:rPr>
-              <a:t>16 Companies Comprise 20% of Overall Total Sales of all 9,762 Companies</a:t>
+              <a:t>Mean: 179774.1</a:t>
             </a:r>
           </a:p>
           <a:p>
             <a:pPr algn="ctr"/>
             <a:r>
-              <a:rPr lang="en-US" dirty="0">
+              <a:rPr lang="en-US" sz="2400" dirty="0">
                 <a:solidFill>
                   <a:schemeClr val="bg1"/>
                 </a:solidFill>
               </a:rPr>
-              <a:t>0.1% of all Companies</a:t>
+              <a:t>Median: 55629.19</a:t>
             </a:r>
           </a:p>
           <a:p>
             <a:pPr algn="ctr"/>
-            <a:endParaRPr lang="en-US" dirty="0">
+            <a:r>
+              <a:rPr lang="en-US" sz="2400" dirty="0">
+                <a:solidFill>
+                  <a:schemeClr val="bg1"/>
+                </a:solidFill>
+              </a:rPr>
+              <a:t>Long Tails in Both Ranges – From &lt;8000 to &gt;12Mil</a:t>
+            </a:r>
+          </a:p>
+          <a:p>
+            <a:pPr algn="ctr"/>
+            <a:endParaRPr lang="en-US" sz="2400" dirty="0">
               <a:solidFill>
                 <a:schemeClr val="bg1"/>
               </a:solidFill>
@@ -21261,21 +21360,52 @@
           </a:p>
         </p:txBody>
       </p:sp>
+      <p:sp>
+        <p:nvSpPr>
+          <p:cNvPr id="6" name="TextBox 5"/>
+          <p:cNvSpPr txBox="1"/>
+          <p:nvPr/>
+        </p:nvSpPr>
+        <p:spPr>
+          <a:xfrm>
+            <a:off x="0" y="4901453"/>
+            <a:ext cx="8458200" cy="230832"/>
+          </a:xfrm>
+          <a:prstGeom prst="rect">
+            <a:avLst/>
+          </a:prstGeom>
+          <a:noFill/>
+        </p:spPr>
+        <p:txBody>
+          <a:bodyPr wrap="square" rtlCol="0">
+            <a:spAutoFit/>
+          </a:bodyPr>
+          <a:lstStyle/>
+          <a:p>
+            <a:r>
+              <a:rPr lang="en-US" sz="900" dirty="0">
+                <a:solidFill>
+                  <a:schemeClr val="bg1"/>
+                </a:solidFill>
+              </a:rPr>
+              <a:t>NOTE: X-AXIS SHOWN ON LOG BASE 10 SCALE</a:t>
+            </a:r>
+          </a:p>
+        </p:txBody>
+      </p:sp>
       <p:pic>
         <p:nvPicPr>
-          <p:cNvPr id="9" name="Content Placeholder 8">
+          <p:cNvPr id="7" name="Picture 6">
             <a:extLst>
               <a:ext uri="{FF2B5EF4-FFF2-40B4-BE49-F238E27FC236}">
-                <a16:creationId xmlns:a16="http://schemas.microsoft.com/office/drawing/2014/main" id="{D6BDE974-AEE9-AC4B-B3BD-5E6EFC9507F5}"/>
+                <a16:creationId xmlns:a16="http://schemas.microsoft.com/office/drawing/2014/main" id="{7AD177BB-C5F5-4346-AB60-1776B1ACB004}"/>
               </a:ext>
             </a:extLst>
           </p:cNvPr>
           <p:cNvPicPr>
-            <a:picLocks noGrp="1" noChangeAspect="1"/>
+            <a:picLocks noChangeAspect="1"/>
           </p:cNvPicPr>
-          <p:nvPr>
-            <p:ph idx="1"/>
-          </p:nvPr>
+          <p:nvPr/>
         </p:nvPicPr>
         <p:blipFill>
           <a:blip r:embed="rId2">
@@ -21291,8 +21421,8 @@
         </p:blipFill>
         <p:spPr>
           <a:xfrm>
-            <a:off x="317500" y="1519822"/>
-            <a:ext cx="8556625" cy="1711325"/>
+            <a:off x="0" y="1657350"/>
+            <a:ext cx="9144000" cy="1828800"/>
           </a:xfrm>
           <a:prstGeom prst="rect">
             <a:avLst/>
@@ -21302,7 +21432,7 @@
     </p:spTree>
     <p:extLst>
       <p:ext uri="{BB962C8B-B14F-4D97-AF65-F5344CB8AC3E}">
-        <p14:creationId xmlns:p14="http://schemas.microsoft.com/office/powerpoint/2010/main" val="2370471185"/>
+        <p14:creationId xmlns:p14="http://schemas.microsoft.com/office/powerpoint/2010/main" val="167675587"/>
       </p:ext>
     </p:extLst>
   </p:cSld>
@@ -22323,9 +22453,12 @@
 </file>
 
 <file path=customXml/item1.xml><?xml version="1.0" encoding="utf-8"?>
-<p:properties xmlns:p="http://schemas.microsoft.com/office/2006/metadata/properties" xmlns:xsi="http://www.w3.org/2001/XMLSchema-instance" xmlns:pc="http://schemas.microsoft.com/office/infopath/2007/PartnerControls">
-  <documentManagement/>
-</p:properties>
+<?mso-contentType ?>
+<FormTemplates xmlns="http://schemas.microsoft.com/sharepoint/v3/contenttype/forms">
+  <Display>DocumentLibraryForm</Display>
+  <Edit>DocumentLibraryForm</Edit>
+  <New>DocumentLibraryForm</New>
+</FormTemplates>
 </file>
 
 <file path=customXml/item2.xml><?xml version="1.0" encoding="utf-8"?>
@@ -22443,25 +22576,15 @@
 </file>
 
 <file path=customXml/item3.xml><?xml version="1.0" encoding="utf-8"?>
-<?mso-contentType ?>
-<FormTemplates xmlns="http://schemas.microsoft.com/sharepoint/v3/contenttype/forms">
-  <Display>DocumentLibraryForm</Display>
-  <Edit>DocumentLibraryForm</Edit>
-  <New>DocumentLibraryForm</New>
-</FormTemplates>
+<p:properties xmlns:p="http://schemas.microsoft.com/office/2006/metadata/properties" xmlns:xsi="http://www.w3.org/2001/XMLSchema-instance" xmlns:pc="http://schemas.microsoft.com/office/infopath/2007/PartnerControls">
+  <documentManagement/>
+</p:properties>
 </file>
 
 <file path=customXml/itemProps1.xml><?xml version="1.0" encoding="utf-8"?>
-<ds:datastoreItem xmlns:ds="http://schemas.openxmlformats.org/officeDocument/2006/customXml" ds:itemID="{7F30D25C-2B8C-4E8E-A3EA-861E33399DB6}">
+<ds:datastoreItem xmlns:ds="http://schemas.openxmlformats.org/officeDocument/2006/customXml" ds:itemID="{09C28EF2-5F72-4F36-9FAB-E29A52179F4E}">
   <ds:schemaRefs>
-    <ds:schemaRef ds:uri="http://purl.org/dc/terms/"/>
-    <ds:schemaRef ds:uri="http://schemas.openxmlformats.org/package/2006/metadata/core-properties"/>
-    <ds:schemaRef ds:uri="http://schemas.microsoft.com/office/2006/documentManagement/types"/>
-    <ds:schemaRef ds:uri="http://schemas.microsoft.com/office/infopath/2007/PartnerControls"/>
-    <ds:schemaRef ds:uri="http://purl.org/dc/elements/1.1/"/>
-    <ds:schemaRef ds:uri="http://schemas.microsoft.com/office/2006/metadata/properties"/>
-    <ds:schemaRef ds:uri="http://www.w3.org/XML/1998/namespace"/>
-    <ds:schemaRef ds:uri="http://purl.org/dc/dcmitype/"/>
+    <ds:schemaRef ds:uri="http://schemas.microsoft.com/sharepoint/v3/contenttype/forms"/>
   </ds:schemaRefs>
 </ds:datastoreItem>
 </file>
@@ -22483,9 +22606,16 @@
 </file>
 
 <file path=customXml/itemProps3.xml><?xml version="1.0" encoding="utf-8"?>
-<ds:datastoreItem xmlns:ds="http://schemas.openxmlformats.org/officeDocument/2006/customXml" ds:itemID="{09C28EF2-5F72-4F36-9FAB-E29A52179F4E}">
+<ds:datastoreItem xmlns:ds="http://schemas.openxmlformats.org/officeDocument/2006/customXml" ds:itemID="{7F30D25C-2B8C-4E8E-A3EA-861E33399DB6}">
   <ds:schemaRefs>
-    <ds:schemaRef ds:uri="http://schemas.microsoft.com/sharepoint/v3/contenttype/forms"/>
+    <ds:schemaRef ds:uri="http://purl.org/dc/terms/"/>
+    <ds:schemaRef ds:uri="http://schemas.openxmlformats.org/package/2006/metadata/core-properties"/>
+    <ds:schemaRef ds:uri="http://schemas.microsoft.com/office/2006/documentManagement/types"/>
+    <ds:schemaRef ds:uri="http://schemas.microsoft.com/office/infopath/2007/PartnerControls"/>
+    <ds:schemaRef ds:uri="http://purl.org/dc/elements/1.1/"/>
+    <ds:schemaRef ds:uri="http://schemas.microsoft.com/office/2006/metadata/properties"/>
+    <ds:schemaRef ds:uri="http://www.w3.org/XML/1998/namespace"/>
+    <ds:schemaRef ds:uri="http://purl.org/dc/dcmitype/"/>
   </ds:schemaRefs>
 </ds:datastoreItem>
 </file>
</xml_diff>